<commit_message>
Update codes in FInal and Midterm folder
</commit_message>
<xml_diff>
--- a/Final/Final.pptx
+++ b/Final/Final.pptx
@@ -9,11 +9,17 @@
     <p:sldId id="257" r:id="rId3"/>
     <p:sldId id="261" r:id="rId4"/>
     <p:sldId id="262" r:id="rId5"/>
-    <p:sldId id="263" r:id="rId6"/>
-    <p:sldId id="264" r:id="rId7"/>
-    <p:sldId id="258" r:id="rId8"/>
-    <p:sldId id="259" r:id="rId9"/>
-    <p:sldId id="260" r:id="rId10"/>
+    <p:sldId id="270" r:id="rId6"/>
+    <p:sldId id="263" r:id="rId7"/>
+    <p:sldId id="264" r:id="rId8"/>
+    <p:sldId id="265" r:id="rId9"/>
+    <p:sldId id="268" r:id="rId10"/>
+    <p:sldId id="258" r:id="rId11"/>
+    <p:sldId id="259" r:id="rId12"/>
+    <p:sldId id="266" r:id="rId13"/>
+    <p:sldId id="267" r:id="rId14"/>
+    <p:sldId id="260" r:id="rId15"/>
+    <p:sldId id="269" r:id="rId16"/>
   </p:sldIdLst>
   <p:sldSz cx="12192000" cy="6858000"/>
   <p:notesSz cx="6858000" cy="9144000"/>
@@ -267,7 +273,7 @@
           <a:p>
             <a:fld id="{0A2D320F-009D-4D5F-A479-510CDAF79B54}" type="datetimeFigureOut">
               <a:rPr lang="zh-TW" altLang="en-US" smtClean="0"/>
-              <a:t>2023/6/11</a:t>
+              <a:t>2023/6/14</a:t>
             </a:fld>
             <a:endParaRPr lang="zh-TW" altLang="en-US"/>
           </a:p>
@@ -465,7 +471,7 @@
           <a:p>
             <a:fld id="{0A2D320F-009D-4D5F-A479-510CDAF79B54}" type="datetimeFigureOut">
               <a:rPr lang="zh-TW" altLang="en-US" smtClean="0"/>
-              <a:t>2023/6/11</a:t>
+              <a:t>2023/6/14</a:t>
             </a:fld>
             <a:endParaRPr lang="zh-TW" altLang="en-US"/>
           </a:p>
@@ -673,7 +679,7 @@
           <a:p>
             <a:fld id="{0A2D320F-009D-4D5F-A479-510CDAF79B54}" type="datetimeFigureOut">
               <a:rPr lang="zh-TW" altLang="en-US" smtClean="0"/>
-              <a:t>2023/6/11</a:t>
+              <a:t>2023/6/14</a:t>
             </a:fld>
             <a:endParaRPr lang="zh-TW" altLang="en-US"/>
           </a:p>
@@ -871,7 +877,7 @@
           <a:p>
             <a:fld id="{0A2D320F-009D-4D5F-A479-510CDAF79B54}" type="datetimeFigureOut">
               <a:rPr lang="zh-TW" altLang="en-US" smtClean="0"/>
-              <a:t>2023/6/11</a:t>
+              <a:t>2023/6/14</a:t>
             </a:fld>
             <a:endParaRPr lang="zh-TW" altLang="en-US"/>
           </a:p>
@@ -1146,7 +1152,7 @@
           <a:p>
             <a:fld id="{0A2D320F-009D-4D5F-A479-510CDAF79B54}" type="datetimeFigureOut">
               <a:rPr lang="zh-TW" altLang="en-US" smtClean="0"/>
-              <a:t>2023/6/11</a:t>
+              <a:t>2023/6/14</a:t>
             </a:fld>
             <a:endParaRPr lang="zh-TW" altLang="en-US"/>
           </a:p>
@@ -1411,7 +1417,7 @@
           <a:p>
             <a:fld id="{0A2D320F-009D-4D5F-A479-510CDAF79B54}" type="datetimeFigureOut">
               <a:rPr lang="zh-TW" altLang="en-US" smtClean="0"/>
-              <a:t>2023/6/11</a:t>
+              <a:t>2023/6/14</a:t>
             </a:fld>
             <a:endParaRPr lang="zh-TW" altLang="en-US"/>
           </a:p>
@@ -1823,7 +1829,7 @@
           <a:p>
             <a:fld id="{0A2D320F-009D-4D5F-A479-510CDAF79B54}" type="datetimeFigureOut">
               <a:rPr lang="zh-TW" altLang="en-US" smtClean="0"/>
-              <a:t>2023/6/11</a:t>
+              <a:t>2023/6/14</a:t>
             </a:fld>
             <a:endParaRPr lang="zh-TW" altLang="en-US"/>
           </a:p>
@@ -1964,7 +1970,7 @@
           <a:p>
             <a:fld id="{0A2D320F-009D-4D5F-A479-510CDAF79B54}" type="datetimeFigureOut">
               <a:rPr lang="zh-TW" altLang="en-US" smtClean="0"/>
-              <a:t>2023/6/11</a:t>
+              <a:t>2023/6/14</a:t>
             </a:fld>
             <a:endParaRPr lang="zh-TW" altLang="en-US"/>
           </a:p>
@@ -2077,7 +2083,7 @@
           <a:p>
             <a:fld id="{0A2D320F-009D-4D5F-A479-510CDAF79B54}" type="datetimeFigureOut">
               <a:rPr lang="zh-TW" altLang="en-US" smtClean="0"/>
-              <a:t>2023/6/11</a:t>
+              <a:t>2023/6/14</a:t>
             </a:fld>
             <a:endParaRPr lang="zh-TW" altLang="en-US"/>
           </a:p>
@@ -2388,7 +2394,7 @@
           <a:p>
             <a:fld id="{0A2D320F-009D-4D5F-A479-510CDAF79B54}" type="datetimeFigureOut">
               <a:rPr lang="zh-TW" altLang="en-US" smtClean="0"/>
-              <a:t>2023/6/11</a:t>
+              <a:t>2023/6/14</a:t>
             </a:fld>
             <a:endParaRPr lang="zh-TW" altLang="en-US"/>
           </a:p>
@@ -2676,7 +2682,7 @@
           <a:p>
             <a:fld id="{0A2D320F-009D-4D5F-A479-510CDAF79B54}" type="datetimeFigureOut">
               <a:rPr lang="zh-TW" altLang="en-US" smtClean="0"/>
-              <a:t>2023/6/11</a:t>
+              <a:t>2023/6/14</a:t>
             </a:fld>
             <a:endParaRPr lang="zh-TW" altLang="en-US"/>
           </a:p>
@@ -2917,7 +2923,7 @@
           <a:p>
             <a:fld id="{0A2D320F-009D-4D5F-A479-510CDAF79B54}" type="datetimeFigureOut">
               <a:rPr lang="zh-TW" altLang="en-US" smtClean="0"/>
-              <a:t>2023/6/11</a:t>
+              <a:t>2023/6/14</a:t>
             </a:fld>
             <a:endParaRPr lang="zh-TW" altLang="en-US"/>
           </a:p>
@@ -3377,6 +3383,912 @@
 </p:sld>
 </file>
 
+<file path=ppt/slides/slide10.xml><?xml version="1.0" encoding="utf-8"?>
+<p:sld xmlns:a="http://schemas.openxmlformats.org/drawingml/2006/main" xmlns:r="http://schemas.openxmlformats.org/officeDocument/2006/relationships" xmlns:p="http://schemas.openxmlformats.org/presentationml/2006/main">
+  <p:cSld>
+    <p:spTree>
+      <p:nvGrpSpPr>
+        <p:cNvPr id="1" name=""/>
+        <p:cNvGrpSpPr/>
+        <p:nvPr/>
+      </p:nvGrpSpPr>
+      <p:grpSpPr>
+        <a:xfrm>
+          <a:off x="0" y="0"/>
+          <a:ext cx="0" cy="0"/>
+          <a:chOff x="0" y="0"/>
+          <a:chExt cx="0" cy="0"/>
+        </a:xfrm>
+      </p:grpSpPr>
+      <p:sp>
+        <p:nvSpPr>
+          <p:cNvPr id="4" name="文字方塊 3">
+            <a:extLst>
+              <a:ext uri="{FF2B5EF4-FFF2-40B4-BE49-F238E27FC236}">
+                <a16:creationId xmlns:a16="http://schemas.microsoft.com/office/drawing/2014/main" id="{EBC796A9-4EE5-CF94-EF7E-728E9750382C}"/>
+              </a:ext>
+            </a:extLst>
+          </p:cNvPr>
+          <p:cNvSpPr txBox="1"/>
+          <p:nvPr/>
+        </p:nvSpPr>
+        <p:spPr>
+          <a:xfrm>
+            <a:off x="895546" y="603315"/>
+            <a:ext cx="3384223" cy="369332"/>
+          </a:xfrm>
+          <a:prstGeom prst="rect">
+            <a:avLst/>
+          </a:prstGeom>
+          <a:noFill/>
+        </p:spPr>
+        <p:txBody>
+          <a:bodyPr wrap="square" rtlCol="0">
+            <a:spAutoFit/>
+          </a:bodyPr>
+          <a:lstStyle/>
+          <a:p>
+            <a:r>
+              <a:rPr lang="en-US" altLang="zh-TW" dirty="0"/>
+              <a:t>Case2 weight range(-2, 2)</a:t>
+            </a:r>
+            <a:endParaRPr lang="zh-TW" altLang="en-US" dirty="0"/>
+          </a:p>
+        </p:txBody>
+      </p:sp>
+      <p:sp>
+        <p:nvSpPr>
+          <p:cNvPr id="7" name="文字方塊 6">
+            <a:extLst>
+              <a:ext uri="{FF2B5EF4-FFF2-40B4-BE49-F238E27FC236}">
+                <a16:creationId xmlns:a16="http://schemas.microsoft.com/office/drawing/2014/main" id="{20C6C570-3ED8-ACC6-3D9D-4C3EA0F935C3}"/>
+              </a:ext>
+            </a:extLst>
+          </p:cNvPr>
+          <p:cNvSpPr txBox="1"/>
+          <p:nvPr/>
+        </p:nvSpPr>
+        <p:spPr>
+          <a:xfrm>
+            <a:off x="1674005" y="4671873"/>
+            <a:ext cx="4274034" cy="646331"/>
+          </a:xfrm>
+          <a:prstGeom prst="rect">
+            <a:avLst/>
+          </a:prstGeom>
+          <a:noFill/>
+        </p:spPr>
+        <p:txBody>
+          <a:bodyPr wrap="square" rtlCol="0">
+            <a:spAutoFit/>
+          </a:bodyPr>
+          <a:lstStyle/>
+          <a:p>
+            <a:r>
+              <a:rPr lang="en-US" altLang="zh-TW" b="0" i="0" dirty="0">
+                <a:solidFill>
+                  <a:srgbClr val="24292E"/>
+                </a:solidFill>
+                <a:effectLst/>
+                <a:latin typeface="Consolas" panose="020B0609020204030204" pitchFamily="49" charset="0"/>
+              </a:rPr>
+              <a:t>Best Test Accuracy: 96.7369 % Best Loss: 0.6299</a:t>
+            </a:r>
+            <a:endParaRPr lang="zh-TW" altLang="en-US" dirty="0"/>
+          </a:p>
+        </p:txBody>
+      </p:sp>
+      <p:pic>
+        <p:nvPicPr>
+          <p:cNvPr id="5" name="圖片 4">
+            <a:extLst>
+              <a:ext uri="{FF2B5EF4-FFF2-40B4-BE49-F238E27FC236}">
+                <a16:creationId xmlns:a16="http://schemas.microsoft.com/office/drawing/2014/main" id="{BE6D4EA8-E2D4-C926-D24A-171B8CAF81D4}"/>
+              </a:ext>
+            </a:extLst>
+          </p:cNvPr>
+          <p:cNvPicPr>
+            <a:picLocks noChangeAspect="1"/>
+          </p:cNvPicPr>
+          <p:nvPr/>
+        </p:nvPicPr>
+        <p:blipFill>
+          <a:blip r:embed="rId2"/>
+          <a:stretch>
+            <a:fillRect/>
+          </a:stretch>
+        </p:blipFill>
+        <p:spPr>
+          <a:xfrm>
+            <a:off x="1401011" y="1351827"/>
+            <a:ext cx="3752363" cy="2940866"/>
+          </a:xfrm>
+          <a:prstGeom prst="rect">
+            <a:avLst/>
+          </a:prstGeom>
+        </p:spPr>
+      </p:pic>
+      <p:pic>
+        <p:nvPicPr>
+          <p:cNvPr id="9" name="圖片 8">
+            <a:extLst>
+              <a:ext uri="{FF2B5EF4-FFF2-40B4-BE49-F238E27FC236}">
+                <a16:creationId xmlns:a16="http://schemas.microsoft.com/office/drawing/2014/main" id="{680515C4-1CB7-7293-DF7F-3DDE3F50AC8B}"/>
+              </a:ext>
+            </a:extLst>
+          </p:cNvPr>
+          <p:cNvPicPr>
+            <a:picLocks noChangeAspect="1"/>
+          </p:cNvPicPr>
+          <p:nvPr/>
+        </p:nvPicPr>
+        <p:blipFill>
+          <a:blip r:embed="rId3"/>
+          <a:stretch>
+            <a:fillRect/>
+          </a:stretch>
+        </p:blipFill>
+        <p:spPr>
+          <a:xfrm>
+            <a:off x="6758676" y="1351827"/>
+            <a:ext cx="4032313" cy="4037424"/>
+          </a:xfrm>
+          <a:prstGeom prst="rect">
+            <a:avLst/>
+          </a:prstGeom>
+        </p:spPr>
+      </p:pic>
+    </p:spTree>
+    <p:extLst>
+      <p:ext uri="{BB962C8B-B14F-4D97-AF65-F5344CB8AC3E}">
+        <p14:creationId xmlns:p14="http://schemas.microsoft.com/office/powerpoint/2010/main" val="2476516935"/>
+      </p:ext>
+    </p:extLst>
+  </p:cSld>
+  <p:clrMapOvr>
+    <a:masterClrMapping/>
+  </p:clrMapOvr>
+</p:sld>
+</file>
+
+<file path=ppt/slides/slide11.xml><?xml version="1.0" encoding="utf-8"?>
+<p:sld xmlns:a="http://schemas.openxmlformats.org/drawingml/2006/main" xmlns:r="http://schemas.openxmlformats.org/officeDocument/2006/relationships" xmlns:p="http://schemas.openxmlformats.org/presentationml/2006/main">
+  <p:cSld>
+    <p:spTree>
+      <p:nvGrpSpPr>
+        <p:cNvPr id="1" name=""/>
+        <p:cNvGrpSpPr/>
+        <p:nvPr/>
+      </p:nvGrpSpPr>
+      <p:grpSpPr>
+        <a:xfrm>
+          <a:off x="0" y="0"/>
+          <a:ext cx="0" cy="0"/>
+          <a:chOff x="0" y="0"/>
+          <a:chExt cx="0" cy="0"/>
+        </a:xfrm>
+      </p:grpSpPr>
+      <p:sp>
+        <p:nvSpPr>
+          <p:cNvPr id="4" name="文字方塊 3">
+            <a:extLst>
+              <a:ext uri="{FF2B5EF4-FFF2-40B4-BE49-F238E27FC236}">
+                <a16:creationId xmlns:a16="http://schemas.microsoft.com/office/drawing/2014/main" id="{EBC796A9-4EE5-CF94-EF7E-728E9750382C}"/>
+              </a:ext>
+            </a:extLst>
+          </p:cNvPr>
+          <p:cNvSpPr txBox="1"/>
+          <p:nvPr/>
+        </p:nvSpPr>
+        <p:spPr>
+          <a:xfrm>
+            <a:off x="895546" y="603315"/>
+            <a:ext cx="3384223" cy="369332"/>
+          </a:xfrm>
+          <a:prstGeom prst="rect">
+            <a:avLst/>
+          </a:prstGeom>
+          <a:noFill/>
+        </p:spPr>
+        <p:txBody>
+          <a:bodyPr wrap="square" rtlCol="0">
+            <a:spAutoFit/>
+          </a:bodyPr>
+          <a:lstStyle/>
+          <a:p>
+            <a:r>
+              <a:rPr lang="en-US" altLang="zh-TW" dirty="0"/>
+              <a:t>Case2 weight range(-4, 4)</a:t>
+            </a:r>
+            <a:endParaRPr lang="zh-TW" altLang="en-US" dirty="0"/>
+          </a:p>
+        </p:txBody>
+      </p:sp>
+      <p:sp>
+        <p:nvSpPr>
+          <p:cNvPr id="7" name="文字方塊 6">
+            <a:extLst>
+              <a:ext uri="{FF2B5EF4-FFF2-40B4-BE49-F238E27FC236}">
+                <a16:creationId xmlns:a16="http://schemas.microsoft.com/office/drawing/2014/main" id="{20C6C570-3ED8-ACC6-3D9D-4C3EA0F935C3}"/>
+              </a:ext>
+            </a:extLst>
+          </p:cNvPr>
+          <p:cNvSpPr txBox="1"/>
+          <p:nvPr/>
+        </p:nvSpPr>
+        <p:spPr>
+          <a:xfrm>
+            <a:off x="1203488" y="5070326"/>
+            <a:ext cx="4131992" cy="646331"/>
+          </a:xfrm>
+          <a:prstGeom prst="rect">
+            <a:avLst/>
+          </a:prstGeom>
+          <a:noFill/>
+        </p:spPr>
+        <p:txBody>
+          <a:bodyPr wrap="square" rtlCol="0">
+            <a:spAutoFit/>
+          </a:bodyPr>
+          <a:lstStyle/>
+          <a:p>
+            <a:r>
+              <a:rPr lang="en-US" altLang="zh-TW" b="0" i="0" dirty="0">
+                <a:solidFill>
+                  <a:srgbClr val="24292E"/>
+                </a:solidFill>
+                <a:effectLst/>
+                <a:latin typeface="Consolas" panose="020B0609020204030204" pitchFamily="49" charset="0"/>
+              </a:rPr>
+              <a:t>Best Test Accuracy: 95.9891 %</a:t>
+            </a:r>
+          </a:p>
+          <a:p>
+            <a:r>
+              <a:rPr lang="en-US" altLang="zh-TW" b="0" i="0" dirty="0">
+                <a:solidFill>
+                  <a:srgbClr val="24292E"/>
+                </a:solidFill>
+                <a:effectLst/>
+                <a:latin typeface="Consolas" panose="020B0609020204030204" pitchFamily="49" charset="0"/>
+              </a:rPr>
+              <a:t>Best Loss: 0.6245</a:t>
+            </a:r>
+            <a:endParaRPr lang="zh-TW" altLang="en-US" dirty="0"/>
+          </a:p>
+        </p:txBody>
+      </p:sp>
+      <p:pic>
+        <p:nvPicPr>
+          <p:cNvPr id="3" name="圖片 2">
+            <a:extLst>
+              <a:ext uri="{FF2B5EF4-FFF2-40B4-BE49-F238E27FC236}">
+                <a16:creationId xmlns:a16="http://schemas.microsoft.com/office/drawing/2014/main" id="{10F7D62C-0EBE-496F-2988-8E72AFB81A2C}"/>
+              </a:ext>
+            </a:extLst>
+          </p:cNvPr>
+          <p:cNvPicPr>
+            <a:picLocks noChangeAspect="1"/>
+          </p:cNvPicPr>
+          <p:nvPr/>
+        </p:nvPicPr>
+        <p:blipFill>
+          <a:blip r:embed="rId2"/>
+          <a:stretch>
+            <a:fillRect/>
+          </a:stretch>
+        </p:blipFill>
+        <p:spPr>
+          <a:xfrm>
+            <a:off x="1203488" y="1532307"/>
+            <a:ext cx="3151144" cy="2469668"/>
+          </a:xfrm>
+          <a:prstGeom prst="rect">
+            <a:avLst/>
+          </a:prstGeom>
+        </p:spPr>
+      </p:pic>
+      <p:pic>
+        <p:nvPicPr>
+          <p:cNvPr id="8" name="圖片 7">
+            <a:extLst>
+              <a:ext uri="{FF2B5EF4-FFF2-40B4-BE49-F238E27FC236}">
+                <a16:creationId xmlns:a16="http://schemas.microsoft.com/office/drawing/2014/main" id="{445536AB-A902-BBF0-5546-8742B3697118}"/>
+              </a:ext>
+            </a:extLst>
+          </p:cNvPr>
+          <p:cNvPicPr>
+            <a:picLocks noChangeAspect="1"/>
+          </p:cNvPicPr>
+          <p:nvPr/>
+        </p:nvPicPr>
+        <p:blipFill>
+          <a:blip r:embed="rId3"/>
+          <a:stretch>
+            <a:fillRect/>
+          </a:stretch>
+        </p:blipFill>
+        <p:spPr>
+          <a:xfrm>
+            <a:off x="6008801" y="883330"/>
+            <a:ext cx="5084894" cy="5091339"/>
+          </a:xfrm>
+          <a:prstGeom prst="rect">
+            <a:avLst/>
+          </a:prstGeom>
+        </p:spPr>
+      </p:pic>
+    </p:spTree>
+    <p:extLst>
+      <p:ext uri="{BB962C8B-B14F-4D97-AF65-F5344CB8AC3E}">
+        <p14:creationId xmlns:p14="http://schemas.microsoft.com/office/powerpoint/2010/main" val="1814585520"/>
+      </p:ext>
+    </p:extLst>
+  </p:cSld>
+  <p:clrMapOvr>
+    <a:masterClrMapping/>
+  </p:clrMapOvr>
+</p:sld>
+</file>
+
+<file path=ppt/slides/slide12.xml><?xml version="1.0" encoding="utf-8"?>
+<p:sld xmlns:a="http://schemas.openxmlformats.org/drawingml/2006/main" xmlns:r="http://schemas.openxmlformats.org/officeDocument/2006/relationships" xmlns:p="http://schemas.openxmlformats.org/presentationml/2006/main">
+  <p:cSld>
+    <p:spTree>
+      <p:nvGrpSpPr>
+        <p:cNvPr id="1" name=""/>
+        <p:cNvGrpSpPr/>
+        <p:nvPr/>
+      </p:nvGrpSpPr>
+      <p:grpSpPr>
+        <a:xfrm>
+          <a:off x="0" y="0"/>
+          <a:ext cx="0" cy="0"/>
+          <a:chOff x="0" y="0"/>
+          <a:chExt cx="0" cy="0"/>
+        </a:xfrm>
+      </p:grpSpPr>
+      <p:sp>
+        <p:nvSpPr>
+          <p:cNvPr id="4" name="文字方塊 3">
+            <a:extLst>
+              <a:ext uri="{FF2B5EF4-FFF2-40B4-BE49-F238E27FC236}">
+                <a16:creationId xmlns:a16="http://schemas.microsoft.com/office/drawing/2014/main" id="{EBC796A9-4EE5-CF94-EF7E-728E9750382C}"/>
+              </a:ext>
+            </a:extLst>
+          </p:cNvPr>
+          <p:cNvSpPr txBox="1"/>
+          <p:nvPr/>
+        </p:nvSpPr>
+        <p:spPr>
+          <a:xfrm>
+            <a:off x="895546" y="603315"/>
+            <a:ext cx="3384223" cy="369332"/>
+          </a:xfrm>
+          <a:prstGeom prst="rect">
+            <a:avLst/>
+          </a:prstGeom>
+          <a:noFill/>
+        </p:spPr>
+        <p:txBody>
+          <a:bodyPr wrap="square" rtlCol="0">
+            <a:spAutoFit/>
+          </a:bodyPr>
+          <a:lstStyle/>
+          <a:p>
+            <a:r>
+              <a:rPr lang="en-US" altLang="zh-TW" dirty="0"/>
+              <a:t>Case2 weight range(-8, 8)</a:t>
+            </a:r>
+            <a:endParaRPr lang="zh-TW" altLang="en-US" dirty="0"/>
+          </a:p>
+        </p:txBody>
+      </p:sp>
+      <p:sp>
+        <p:nvSpPr>
+          <p:cNvPr id="7" name="文字方塊 6">
+            <a:extLst>
+              <a:ext uri="{FF2B5EF4-FFF2-40B4-BE49-F238E27FC236}">
+                <a16:creationId xmlns:a16="http://schemas.microsoft.com/office/drawing/2014/main" id="{20C6C570-3ED8-ACC6-3D9D-4C3EA0F935C3}"/>
+              </a:ext>
+            </a:extLst>
+          </p:cNvPr>
+          <p:cNvSpPr txBox="1"/>
+          <p:nvPr/>
+        </p:nvSpPr>
+        <p:spPr>
+          <a:xfrm>
+            <a:off x="1203488" y="5070326"/>
+            <a:ext cx="4131992" cy="646331"/>
+          </a:xfrm>
+          <a:prstGeom prst="rect">
+            <a:avLst/>
+          </a:prstGeom>
+          <a:noFill/>
+        </p:spPr>
+        <p:txBody>
+          <a:bodyPr wrap="square" rtlCol="0">
+            <a:spAutoFit/>
+          </a:bodyPr>
+          <a:lstStyle/>
+          <a:p>
+            <a:r>
+              <a:rPr lang="en-US" altLang="zh-TW" b="0" i="0" dirty="0">
+                <a:solidFill>
+                  <a:srgbClr val="24292E"/>
+                </a:solidFill>
+                <a:effectLst/>
+                <a:latin typeface="Consolas" panose="020B0609020204030204" pitchFamily="49" charset="0"/>
+              </a:rPr>
+              <a:t>Best Test Accuracy: 91.8763 % Best Loss: 0.7612</a:t>
+            </a:r>
+            <a:endParaRPr lang="zh-TW" altLang="en-US" dirty="0"/>
+          </a:p>
+        </p:txBody>
+      </p:sp>
+      <p:pic>
+        <p:nvPicPr>
+          <p:cNvPr id="5" name="圖片 4">
+            <a:extLst>
+              <a:ext uri="{FF2B5EF4-FFF2-40B4-BE49-F238E27FC236}">
+                <a16:creationId xmlns:a16="http://schemas.microsoft.com/office/drawing/2014/main" id="{DB6C6C46-9992-AE1F-8F06-BDA6624EF13B}"/>
+              </a:ext>
+            </a:extLst>
+          </p:cNvPr>
+          <p:cNvPicPr>
+            <a:picLocks noChangeAspect="1"/>
+          </p:cNvPicPr>
+          <p:nvPr/>
+        </p:nvPicPr>
+        <p:blipFill>
+          <a:blip r:embed="rId2"/>
+          <a:stretch>
+            <a:fillRect/>
+          </a:stretch>
+        </p:blipFill>
+        <p:spPr>
+          <a:xfrm>
+            <a:off x="1234229" y="1681141"/>
+            <a:ext cx="3520146" cy="2758869"/>
+          </a:xfrm>
+          <a:prstGeom prst="rect">
+            <a:avLst/>
+          </a:prstGeom>
+        </p:spPr>
+      </p:pic>
+      <p:pic>
+        <p:nvPicPr>
+          <p:cNvPr id="9" name="圖片 8">
+            <a:extLst>
+              <a:ext uri="{FF2B5EF4-FFF2-40B4-BE49-F238E27FC236}">
+                <a16:creationId xmlns:a16="http://schemas.microsoft.com/office/drawing/2014/main" id="{5B177121-2694-227E-7F9E-1E23F09E12A8}"/>
+              </a:ext>
+            </a:extLst>
+          </p:cNvPr>
+          <p:cNvPicPr>
+            <a:picLocks noChangeAspect="1"/>
+          </p:cNvPicPr>
+          <p:nvPr/>
+        </p:nvPicPr>
+        <p:blipFill>
+          <a:blip r:embed="rId3"/>
+          <a:stretch>
+            <a:fillRect/>
+          </a:stretch>
+        </p:blipFill>
+        <p:spPr>
+          <a:xfrm>
+            <a:off x="6297967" y="787981"/>
+            <a:ext cx="5133425" cy="5133425"/>
+          </a:xfrm>
+          <a:prstGeom prst="rect">
+            <a:avLst/>
+          </a:prstGeom>
+        </p:spPr>
+      </p:pic>
+    </p:spTree>
+    <p:extLst>
+      <p:ext uri="{BB962C8B-B14F-4D97-AF65-F5344CB8AC3E}">
+        <p14:creationId xmlns:p14="http://schemas.microsoft.com/office/powerpoint/2010/main" val="1770475781"/>
+      </p:ext>
+    </p:extLst>
+  </p:cSld>
+  <p:clrMapOvr>
+    <a:masterClrMapping/>
+  </p:clrMapOvr>
+</p:sld>
+</file>
+
+<file path=ppt/slides/slide13.xml><?xml version="1.0" encoding="utf-8"?>
+<p:sld xmlns:a="http://schemas.openxmlformats.org/drawingml/2006/main" xmlns:r="http://schemas.openxmlformats.org/officeDocument/2006/relationships" xmlns:p="http://schemas.openxmlformats.org/presentationml/2006/main">
+  <p:cSld>
+    <p:spTree>
+      <p:nvGrpSpPr>
+        <p:cNvPr id="1" name=""/>
+        <p:cNvGrpSpPr/>
+        <p:nvPr/>
+      </p:nvGrpSpPr>
+      <p:grpSpPr>
+        <a:xfrm>
+          <a:off x="0" y="0"/>
+          <a:ext cx="0" cy="0"/>
+          <a:chOff x="0" y="0"/>
+          <a:chExt cx="0" cy="0"/>
+        </a:xfrm>
+      </p:grpSpPr>
+      <p:sp>
+        <p:nvSpPr>
+          <p:cNvPr id="4" name="文字方塊 3">
+            <a:extLst>
+              <a:ext uri="{FF2B5EF4-FFF2-40B4-BE49-F238E27FC236}">
+                <a16:creationId xmlns:a16="http://schemas.microsoft.com/office/drawing/2014/main" id="{EBC796A9-4EE5-CF94-EF7E-728E9750382C}"/>
+              </a:ext>
+            </a:extLst>
+          </p:cNvPr>
+          <p:cNvSpPr txBox="1"/>
+          <p:nvPr/>
+        </p:nvSpPr>
+        <p:spPr>
+          <a:xfrm>
+            <a:off x="895546" y="603315"/>
+            <a:ext cx="3384223" cy="369332"/>
+          </a:xfrm>
+          <a:prstGeom prst="rect">
+            <a:avLst/>
+          </a:prstGeom>
+          <a:noFill/>
+        </p:spPr>
+        <p:txBody>
+          <a:bodyPr wrap="square" rtlCol="0">
+            <a:spAutoFit/>
+          </a:bodyPr>
+          <a:lstStyle/>
+          <a:p>
+            <a:r>
+              <a:rPr lang="en-US" altLang="zh-TW" dirty="0"/>
+              <a:t>Case2 weight range(-10, 10)</a:t>
+            </a:r>
+            <a:endParaRPr lang="zh-TW" altLang="en-US" dirty="0"/>
+          </a:p>
+        </p:txBody>
+      </p:sp>
+      <p:sp>
+        <p:nvSpPr>
+          <p:cNvPr id="7" name="文字方塊 6">
+            <a:extLst>
+              <a:ext uri="{FF2B5EF4-FFF2-40B4-BE49-F238E27FC236}">
+                <a16:creationId xmlns:a16="http://schemas.microsoft.com/office/drawing/2014/main" id="{20C6C570-3ED8-ACC6-3D9D-4C3EA0F935C3}"/>
+              </a:ext>
+            </a:extLst>
+          </p:cNvPr>
+          <p:cNvSpPr txBox="1"/>
+          <p:nvPr/>
+        </p:nvSpPr>
+        <p:spPr>
+          <a:xfrm>
+            <a:off x="1203488" y="5070326"/>
+            <a:ext cx="4131992" cy="646331"/>
+          </a:xfrm>
+          <a:prstGeom prst="rect">
+            <a:avLst/>
+          </a:prstGeom>
+          <a:noFill/>
+        </p:spPr>
+        <p:txBody>
+          <a:bodyPr wrap="square" rtlCol="0">
+            <a:spAutoFit/>
+          </a:bodyPr>
+          <a:lstStyle/>
+          <a:p>
+            <a:r>
+              <a:rPr lang="en-US" altLang="zh-TW" b="0" i="0" dirty="0">
+                <a:solidFill>
+                  <a:srgbClr val="24292E"/>
+                </a:solidFill>
+                <a:effectLst/>
+                <a:latin typeface="Consolas" panose="020B0609020204030204" pitchFamily="49" charset="0"/>
+              </a:rPr>
+              <a:t>Best Test Accuracy: 84.1944 % Best Loss: 0.9460</a:t>
+            </a:r>
+            <a:endParaRPr lang="zh-TW" altLang="en-US" dirty="0"/>
+          </a:p>
+        </p:txBody>
+      </p:sp>
+      <p:pic>
+        <p:nvPicPr>
+          <p:cNvPr id="3" name="圖片 2">
+            <a:extLst>
+              <a:ext uri="{FF2B5EF4-FFF2-40B4-BE49-F238E27FC236}">
+                <a16:creationId xmlns:a16="http://schemas.microsoft.com/office/drawing/2014/main" id="{E0233C80-033F-89A4-09FE-412BEF3267DB}"/>
+              </a:ext>
+            </a:extLst>
+          </p:cNvPr>
+          <p:cNvPicPr>
+            <a:picLocks noChangeAspect="1"/>
+          </p:cNvPicPr>
+          <p:nvPr/>
+        </p:nvPicPr>
+        <p:blipFill>
+          <a:blip r:embed="rId2"/>
+          <a:stretch>
+            <a:fillRect/>
+          </a:stretch>
+        </p:blipFill>
+        <p:spPr>
+          <a:xfrm>
+            <a:off x="1341199" y="1521344"/>
+            <a:ext cx="3994281" cy="3130466"/>
+          </a:xfrm>
+          <a:prstGeom prst="rect">
+            <a:avLst/>
+          </a:prstGeom>
+        </p:spPr>
+      </p:pic>
+      <p:pic>
+        <p:nvPicPr>
+          <p:cNvPr id="8" name="圖片 7">
+            <a:extLst>
+              <a:ext uri="{FF2B5EF4-FFF2-40B4-BE49-F238E27FC236}">
+                <a16:creationId xmlns:a16="http://schemas.microsoft.com/office/drawing/2014/main" id="{F1427D3E-E5E0-489C-9546-696B11B503C5}"/>
+              </a:ext>
+            </a:extLst>
+          </p:cNvPr>
+          <p:cNvPicPr>
+            <a:picLocks noChangeAspect="1"/>
+          </p:cNvPicPr>
+          <p:nvPr/>
+        </p:nvPicPr>
+        <p:blipFill>
+          <a:blip r:embed="rId3"/>
+          <a:stretch>
+            <a:fillRect/>
+          </a:stretch>
+        </p:blipFill>
+        <p:spPr>
+          <a:xfrm>
+            <a:off x="5964955" y="939356"/>
+            <a:ext cx="5288827" cy="5295530"/>
+          </a:xfrm>
+          <a:prstGeom prst="rect">
+            <a:avLst/>
+          </a:prstGeom>
+        </p:spPr>
+      </p:pic>
+    </p:spTree>
+    <p:extLst>
+      <p:ext uri="{BB962C8B-B14F-4D97-AF65-F5344CB8AC3E}">
+        <p14:creationId xmlns:p14="http://schemas.microsoft.com/office/powerpoint/2010/main" val="373139300"/>
+      </p:ext>
+    </p:extLst>
+  </p:cSld>
+  <p:clrMapOvr>
+    <a:masterClrMapping/>
+  </p:clrMapOvr>
+</p:sld>
+</file>
+
+<file path=ppt/slides/slide14.xml><?xml version="1.0" encoding="utf-8"?>
+<p:sld xmlns:a="http://schemas.openxmlformats.org/drawingml/2006/main" xmlns:r="http://schemas.openxmlformats.org/officeDocument/2006/relationships" xmlns:p="http://schemas.openxmlformats.org/presentationml/2006/main">
+  <p:cSld>
+    <p:spTree>
+      <p:nvGrpSpPr>
+        <p:cNvPr id="1" name=""/>
+        <p:cNvGrpSpPr/>
+        <p:nvPr/>
+      </p:nvGrpSpPr>
+      <p:grpSpPr>
+        <a:xfrm>
+          <a:off x="0" y="0"/>
+          <a:ext cx="0" cy="0"/>
+          <a:chOff x="0" y="0"/>
+          <a:chExt cx="0" cy="0"/>
+        </a:xfrm>
+      </p:grpSpPr>
+      <p:sp>
+        <p:nvSpPr>
+          <p:cNvPr id="4" name="文字方塊 3">
+            <a:extLst>
+              <a:ext uri="{FF2B5EF4-FFF2-40B4-BE49-F238E27FC236}">
+                <a16:creationId xmlns:a16="http://schemas.microsoft.com/office/drawing/2014/main" id="{EBC796A9-4EE5-CF94-EF7E-728E9750382C}"/>
+              </a:ext>
+            </a:extLst>
+          </p:cNvPr>
+          <p:cNvSpPr txBox="1"/>
+          <p:nvPr/>
+        </p:nvSpPr>
+        <p:spPr>
+          <a:xfrm>
+            <a:off x="895546" y="603315"/>
+            <a:ext cx="3384223" cy="369332"/>
+          </a:xfrm>
+          <a:prstGeom prst="rect">
+            <a:avLst/>
+          </a:prstGeom>
+          <a:noFill/>
+        </p:spPr>
+        <p:txBody>
+          <a:bodyPr wrap="square" rtlCol="0">
+            <a:spAutoFit/>
+          </a:bodyPr>
+          <a:lstStyle/>
+          <a:p>
+            <a:r>
+              <a:rPr lang="en-US" altLang="zh-TW" dirty="0"/>
+              <a:t>Case2 weight range(-6, 6)</a:t>
+            </a:r>
+            <a:endParaRPr lang="zh-TW" altLang="en-US" dirty="0"/>
+          </a:p>
+        </p:txBody>
+      </p:sp>
+      <p:sp>
+        <p:nvSpPr>
+          <p:cNvPr id="7" name="文字方塊 6">
+            <a:extLst>
+              <a:ext uri="{FF2B5EF4-FFF2-40B4-BE49-F238E27FC236}">
+                <a16:creationId xmlns:a16="http://schemas.microsoft.com/office/drawing/2014/main" id="{20C6C570-3ED8-ACC6-3D9D-4C3EA0F935C3}"/>
+              </a:ext>
+            </a:extLst>
+          </p:cNvPr>
+          <p:cNvSpPr txBox="1"/>
+          <p:nvPr/>
+        </p:nvSpPr>
+        <p:spPr>
+          <a:xfrm>
+            <a:off x="1203488" y="5070326"/>
+            <a:ext cx="3222463" cy="369332"/>
+          </a:xfrm>
+          <a:prstGeom prst="rect">
+            <a:avLst/>
+          </a:prstGeom>
+          <a:noFill/>
+        </p:spPr>
+        <p:txBody>
+          <a:bodyPr wrap="square" rtlCol="0">
+            <a:spAutoFit/>
+          </a:bodyPr>
+          <a:lstStyle/>
+          <a:p>
+            <a:r>
+              <a:rPr lang="en-US" altLang="zh-TW"/>
+              <a:t>Best Test Accuracy: 98.4112 %</a:t>
+            </a:r>
+            <a:endParaRPr lang="zh-TW" altLang="en-US" dirty="0"/>
+          </a:p>
+        </p:txBody>
+      </p:sp>
+      <p:pic>
+        <p:nvPicPr>
+          <p:cNvPr id="3" name="圖片 2">
+            <a:extLst>
+              <a:ext uri="{FF2B5EF4-FFF2-40B4-BE49-F238E27FC236}">
+                <a16:creationId xmlns:a16="http://schemas.microsoft.com/office/drawing/2014/main" id="{A0B72697-5956-65C7-055F-5A6DA43FF598}"/>
+              </a:ext>
+            </a:extLst>
+          </p:cNvPr>
+          <p:cNvPicPr>
+            <a:picLocks noChangeAspect="1"/>
+          </p:cNvPicPr>
+          <p:nvPr/>
+        </p:nvPicPr>
+        <p:blipFill>
+          <a:blip r:embed="rId2"/>
+          <a:stretch>
+            <a:fillRect/>
+          </a:stretch>
+        </p:blipFill>
+        <p:spPr>
+          <a:xfrm>
+            <a:off x="923826" y="1787674"/>
+            <a:ext cx="3827283" cy="2842928"/>
+          </a:xfrm>
+          <a:prstGeom prst="rect">
+            <a:avLst/>
+          </a:prstGeom>
+        </p:spPr>
+      </p:pic>
+      <p:pic>
+        <p:nvPicPr>
+          <p:cNvPr id="8" name="圖片 7">
+            <a:extLst>
+              <a:ext uri="{FF2B5EF4-FFF2-40B4-BE49-F238E27FC236}">
+                <a16:creationId xmlns:a16="http://schemas.microsoft.com/office/drawing/2014/main" id="{08ED0AFF-F54C-31D9-BE7C-612F44A131B4}"/>
+              </a:ext>
+            </a:extLst>
+          </p:cNvPr>
+          <p:cNvPicPr>
+            <a:picLocks noChangeAspect="1"/>
+          </p:cNvPicPr>
+          <p:nvPr/>
+        </p:nvPicPr>
+        <p:blipFill>
+          <a:blip r:embed="rId3"/>
+          <a:stretch>
+            <a:fillRect/>
+          </a:stretch>
+        </p:blipFill>
+        <p:spPr>
+          <a:xfrm>
+            <a:off x="5637229" y="443060"/>
+            <a:ext cx="5950398" cy="5971880"/>
+          </a:xfrm>
+          <a:prstGeom prst="rect">
+            <a:avLst/>
+          </a:prstGeom>
+        </p:spPr>
+      </p:pic>
+    </p:spTree>
+    <p:extLst>
+      <p:ext uri="{BB962C8B-B14F-4D97-AF65-F5344CB8AC3E}">
+        <p14:creationId xmlns:p14="http://schemas.microsoft.com/office/powerpoint/2010/main" val="2457229101"/>
+      </p:ext>
+    </p:extLst>
+  </p:cSld>
+  <p:clrMapOvr>
+    <a:masterClrMapping/>
+  </p:clrMapOvr>
+</p:sld>
+</file>
+
+<file path=ppt/slides/slide15.xml><?xml version="1.0" encoding="utf-8"?>
+<p:sld xmlns:a="http://schemas.openxmlformats.org/drawingml/2006/main" xmlns:r="http://schemas.openxmlformats.org/officeDocument/2006/relationships" xmlns:p="http://schemas.openxmlformats.org/presentationml/2006/main">
+  <p:cSld>
+    <p:spTree>
+      <p:nvGrpSpPr>
+        <p:cNvPr id="1" name=""/>
+        <p:cNvGrpSpPr/>
+        <p:nvPr/>
+      </p:nvGrpSpPr>
+      <p:grpSpPr>
+        <a:xfrm>
+          <a:off x="0" y="0"/>
+          <a:ext cx="0" cy="0"/>
+          <a:chOff x="0" y="0"/>
+          <a:chExt cx="0" cy="0"/>
+        </a:xfrm>
+      </p:grpSpPr>
+      <p:pic>
+        <p:nvPicPr>
+          <p:cNvPr id="5" name="圖片 4">
+            <a:extLst>
+              <a:ext uri="{FF2B5EF4-FFF2-40B4-BE49-F238E27FC236}">
+                <a16:creationId xmlns:a16="http://schemas.microsoft.com/office/drawing/2014/main" id="{FA49A931-B003-2D19-6898-228DF52E028E}"/>
+              </a:ext>
+            </a:extLst>
+          </p:cNvPr>
+          <p:cNvPicPr>
+            <a:picLocks noChangeAspect="1"/>
+          </p:cNvPicPr>
+          <p:nvPr/>
+        </p:nvPicPr>
+        <p:blipFill>
+          <a:blip r:embed="rId2"/>
+          <a:stretch>
+            <a:fillRect/>
+          </a:stretch>
+        </p:blipFill>
+        <p:spPr>
+          <a:xfrm>
+            <a:off x="1485669" y="2077375"/>
+            <a:ext cx="4314471" cy="3271744"/>
+          </a:xfrm>
+          <a:prstGeom prst="rect">
+            <a:avLst/>
+          </a:prstGeom>
+        </p:spPr>
+      </p:pic>
+    </p:spTree>
+    <p:extLst>
+      <p:ext uri="{BB962C8B-B14F-4D97-AF65-F5344CB8AC3E}">
+        <p14:creationId xmlns:p14="http://schemas.microsoft.com/office/powerpoint/2010/main" val="713134093"/>
+      </p:ext>
+    </p:extLst>
+  </p:cSld>
+  <p:clrMapOvr>
+    <a:masterClrMapping/>
+  </p:clrMapOvr>
+</p:sld>
+</file>
+
 <file path=ppt/slides/slide2.xml><?xml version="1.0" encoding="utf-8"?>
 <p:sld xmlns:a="http://schemas.openxmlformats.org/drawingml/2006/main" xmlns:r="http://schemas.openxmlformats.org/officeDocument/2006/relationships" xmlns:p="http://schemas.openxmlformats.org/presentationml/2006/main">
   <p:cSld>
@@ -4184,7 +5096,7 @@
           <a:p>
             <a:r>
               <a:rPr lang="en-US" altLang="zh-TW" dirty="0"/>
-              <a:t>Case3</a:t>
+              <a:t>Case3 (-6, 6)</a:t>
             </a:r>
             <a:endParaRPr lang="zh-TW" altLang="en-US" dirty="0"/>
           </a:p>
@@ -4355,7 +5267,7 @@
     </p:spTree>
     <p:extLst>
       <p:ext uri="{BB962C8B-B14F-4D97-AF65-F5344CB8AC3E}">
-        <p14:creationId xmlns:p14="http://schemas.microsoft.com/office/powerpoint/2010/main" val="807420148"/>
+        <p14:creationId xmlns:p14="http://schemas.microsoft.com/office/powerpoint/2010/main" val="2373698390"/>
       </p:ext>
     </p:extLst>
   </p:cSld>
@@ -4382,12 +5294,102 @@
           <a:chExt cx="0" cy="0"/>
         </a:xfrm>
       </p:grpSpPr>
+      <p:sp>
+        <p:nvSpPr>
+          <p:cNvPr id="4" name="文字方塊 3">
+            <a:extLst>
+              <a:ext uri="{FF2B5EF4-FFF2-40B4-BE49-F238E27FC236}">
+                <a16:creationId xmlns:a16="http://schemas.microsoft.com/office/drawing/2014/main" id="{EBC796A9-4EE5-CF94-EF7E-728E9750382C}"/>
+              </a:ext>
+            </a:extLst>
+          </p:cNvPr>
+          <p:cNvSpPr txBox="1"/>
+          <p:nvPr/>
+        </p:nvSpPr>
+        <p:spPr>
+          <a:xfrm>
+            <a:off x="895546" y="603315"/>
+            <a:ext cx="2375555" cy="369332"/>
+          </a:xfrm>
+          <a:prstGeom prst="rect">
+            <a:avLst/>
+          </a:prstGeom>
+          <a:noFill/>
+        </p:spPr>
+        <p:txBody>
+          <a:bodyPr wrap="square" rtlCol="0">
+            <a:spAutoFit/>
+          </a:bodyPr>
+          <a:lstStyle/>
+          <a:p>
+            <a:r>
+              <a:rPr lang="en-US" altLang="zh-TW" dirty="0"/>
+              <a:t>Case3 (-2, 2)</a:t>
+            </a:r>
+            <a:endParaRPr lang="zh-TW" altLang="en-US" dirty="0"/>
+          </a:p>
+        </p:txBody>
+      </p:sp>
+      <p:sp>
+        <p:nvSpPr>
+          <p:cNvPr id="7" name="文字方塊 6">
+            <a:extLst>
+              <a:ext uri="{FF2B5EF4-FFF2-40B4-BE49-F238E27FC236}">
+                <a16:creationId xmlns:a16="http://schemas.microsoft.com/office/drawing/2014/main" id="{20C6C570-3ED8-ACC6-3D9D-4C3EA0F935C3}"/>
+              </a:ext>
+            </a:extLst>
+          </p:cNvPr>
+          <p:cNvSpPr txBox="1"/>
+          <p:nvPr/>
+        </p:nvSpPr>
+        <p:spPr>
+          <a:xfrm>
+            <a:off x="1203488" y="5042046"/>
+            <a:ext cx="4274034" cy="646331"/>
+          </a:xfrm>
+          <a:prstGeom prst="rect">
+            <a:avLst/>
+          </a:prstGeom>
+          <a:noFill/>
+        </p:spPr>
+        <p:txBody>
+          <a:bodyPr wrap="square" rtlCol="0">
+            <a:spAutoFit/>
+          </a:bodyPr>
+          <a:lstStyle/>
+          <a:p>
+            <a:r>
+              <a:rPr lang="en-US" altLang="zh-TW" b="0" i="0" dirty="0">
+                <a:solidFill>
+                  <a:srgbClr val="24292E"/>
+                </a:solidFill>
+                <a:effectLst/>
+                <a:latin typeface="Consolas" panose="020B0609020204030204" pitchFamily="49" charset="0"/>
+              </a:rPr>
+              <a:t>Best Test Accuracy: 96.3630 %</a:t>
+            </a:r>
+          </a:p>
+          <a:p>
+            <a:r>
+              <a:rPr lang="en-US" altLang="zh-TW" b="0" i="0" dirty="0">
+                <a:solidFill>
+                  <a:srgbClr val="24292E"/>
+                </a:solidFill>
+                <a:effectLst/>
+                <a:latin typeface="Consolas" panose="020B0609020204030204" pitchFamily="49" charset="0"/>
+              </a:rPr>
+              <a:t>Best Loss: 0.6100</a:t>
+            </a:r>
+            <a:endParaRPr lang="zh-TW" altLang="en-US" dirty="0"/>
+          </a:p>
+        </p:txBody>
+      </p:sp>
       <p:pic>
         <p:nvPicPr>
           <p:cNvPr id="5" name="圖片 4">
             <a:extLst>
               <a:ext uri="{FF2B5EF4-FFF2-40B4-BE49-F238E27FC236}">
-                <a16:creationId xmlns:a16="http://schemas.microsoft.com/office/drawing/2014/main" id="{92651899-9E56-4B8D-FB42-9ACCFABB2AEC}"/>
+                <a16:creationId xmlns:a16="http://schemas.microsoft.com/office/drawing/2014/main" id="{FA7CE63F-82D1-183D-921C-5197E444E8D5}"/>
               </a:ext>
             </a:extLst>
           </p:cNvPr>
@@ -4404,18 +5406,84 @@
         </p:blipFill>
         <p:spPr>
           <a:xfrm>
-            <a:off x="917498" y="1935647"/>
-            <a:ext cx="4462370" cy="3383899"/>
+            <a:off x="1197736" y="1477293"/>
+            <a:ext cx="4000790" cy="3135567"/>
           </a:xfrm>
           <a:prstGeom prst="rect">
             <a:avLst/>
           </a:prstGeom>
         </p:spPr>
       </p:pic>
+      <p:pic>
+        <p:nvPicPr>
+          <p:cNvPr id="9" name="圖片 8">
+            <a:extLst>
+              <a:ext uri="{FF2B5EF4-FFF2-40B4-BE49-F238E27FC236}">
+                <a16:creationId xmlns:a16="http://schemas.microsoft.com/office/drawing/2014/main" id="{60C81798-BDA3-DA11-8651-83FFC6FD216F}"/>
+              </a:ext>
+            </a:extLst>
+          </p:cNvPr>
+          <p:cNvPicPr>
+            <a:picLocks noChangeAspect="1"/>
+          </p:cNvPicPr>
+          <p:nvPr/>
+        </p:nvPicPr>
+        <p:blipFill>
+          <a:blip r:embed="rId3"/>
+          <a:stretch>
+            <a:fillRect/>
+          </a:stretch>
+        </p:blipFill>
+        <p:spPr>
+          <a:xfrm>
+            <a:off x="6271334" y="958418"/>
+            <a:ext cx="4941164" cy="4941164"/>
+          </a:xfrm>
+          <a:prstGeom prst="rect">
+            <a:avLst/>
+          </a:prstGeom>
+        </p:spPr>
+      </p:pic>
+      <p:sp>
+        <p:nvSpPr>
+          <p:cNvPr id="10" name="文字方塊 9">
+            <a:extLst>
+              <a:ext uri="{FF2B5EF4-FFF2-40B4-BE49-F238E27FC236}">
+                <a16:creationId xmlns:a16="http://schemas.microsoft.com/office/drawing/2014/main" id="{9F321A9F-5925-052B-81B1-2FBDF4C1C2EB}"/>
+              </a:ext>
+            </a:extLst>
+          </p:cNvPr>
+          <p:cNvSpPr txBox="1"/>
+          <p:nvPr/>
+        </p:nvSpPr>
+        <p:spPr>
+          <a:xfrm>
+            <a:off x="2672179" y="603682"/>
+            <a:ext cx="2547891" cy="369332"/>
+          </a:xfrm>
+          <a:prstGeom prst="rect">
+            <a:avLst/>
+          </a:prstGeom>
+          <a:noFill/>
+        </p:spPr>
+        <p:txBody>
+          <a:bodyPr wrap="square" rtlCol="0">
+            <a:spAutoFit/>
+          </a:bodyPr>
+          <a:lstStyle/>
+          <a:p>
+            <a:r>
+              <a:rPr lang="en-US" altLang="zh-TW" dirty="0"/>
+              <a:t>Dataset: MNIST ‘3’, ‘6’, ‘8’</a:t>
+            </a:r>
+            <a:endParaRPr lang="zh-TW" altLang="en-US" dirty="0"/>
+          </a:p>
+        </p:txBody>
+      </p:sp>
     </p:spTree>
     <p:extLst>
       <p:ext uri="{BB962C8B-B14F-4D97-AF65-F5344CB8AC3E}">
-        <p14:creationId xmlns:p14="http://schemas.microsoft.com/office/powerpoint/2010/main" val="1372084729"/>
+        <p14:creationId xmlns:p14="http://schemas.microsoft.com/office/powerpoint/2010/main" val="807420148"/>
       </p:ext>
     </p:extLst>
   </p:cSld>
@@ -4442,84 +5510,12 @@
           <a:chExt cx="0" cy="0"/>
         </a:xfrm>
       </p:grpSpPr>
-      <p:sp>
-        <p:nvSpPr>
-          <p:cNvPr id="4" name="文字方塊 3">
-            <a:extLst>
-              <a:ext uri="{FF2B5EF4-FFF2-40B4-BE49-F238E27FC236}">
-                <a16:creationId xmlns:a16="http://schemas.microsoft.com/office/drawing/2014/main" id="{EBC796A9-4EE5-CF94-EF7E-728E9750382C}"/>
-              </a:ext>
-            </a:extLst>
-          </p:cNvPr>
-          <p:cNvSpPr txBox="1"/>
-          <p:nvPr/>
-        </p:nvSpPr>
-        <p:spPr>
-          <a:xfrm>
-            <a:off x="895546" y="603315"/>
-            <a:ext cx="3384223" cy="369332"/>
-          </a:xfrm>
-          <a:prstGeom prst="rect">
-            <a:avLst/>
-          </a:prstGeom>
-          <a:noFill/>
-        </p:spPr>
-        <p:txBody>
-          <a:bodyPr wrap="square" rtlCol="0">
-            <a:spAutoFit/>
-          </a:bodyPr>
-          <a:lstStyle/>
-          <a:p>
-            <a:r>
-              <a:rPr lang="en-US" altLang="zh-TW" dirty="0"/>
-              <a:t>Case2 weight range(-2, 2)</a:t>
-            </a:r>
-            <a:endParaRPr lang="zh-TW" altLang="en-US" dirty="0"/>
-          </a:p>
-        </p:txBody>
-      </p:sp>
-      <p:sp>
-        <p:nvSpPr>
-          <p:cNvPr id="7" name="文字方塊 6">
-            <a:extLst>
-              <a:ext uri="{FF2B5EF4-FFF2-40B4-BE49-F238E27FC236}">
-                <a16:creationId xmlns:a16="http://schemas.microsoft.com/office/drawing/2014/main" id="{20C6C570-3ED8-ACC6-3D9D-4C3EA0F935C3}"/>
-              </a:ext>
-            </a:extLst>
-          </p:cNvPr>
-          <p:cNvSpPr txBox="1"/>
-          <p:nvPr/>
-        </p:nvSpPr>
-        <p:spPr>
-          <a:xfrm>
-            <a:off x="1203488" y="5070326"/>
-            <a:ext cx="3222463" cy="369332"/>
-          </a:xfrm>
-          <a:prstGeom prst="rect">
-            <a:avLst/>
-          </a:prstGeom>
-          <a:noFill/>
-        </p:spPr>
-        <p:txBody>
-          <a:bodyPr wrap="square" rtlCol="0">
-            <a:spAutoFit/>
-          </a:bodyPr>
-          <a:lstStyle/>
-          <a:p>
-            <a:r>
-              <a:rPr lang="en-US" altLang="zh-TW"/>
-              <a:t>Best Test Accuracy: 99.1420 %</a:t>
-            </a:r>
-            <a:endParaRPr lang="zh-TW" altLang="en-US" dirty="0"/>
-          </a:p>
-        </p:txBody>
-      </p:sp>
       <p:pic>
         <p:nvPicPr>
-          <p:cNvPr id="3" name="圖片 2">
-            <a:extLst>
-              <a:ext uri="{FF2B5EF4-FFF2-40B4-BE49-F238E27FC236}">
-                <a16:creationId xmlns:a16="http://schemas.microsoft.com/office/drawing/2014/main" id="{26553022-B8AE-05C5-EA8E-F41F487C64E0}"/>
+          <p:cNvPr id="5" name="圖片 4">
+            <a:extLst>
+              <a:ext uri="{FF2B5EF4-FFF2-40B4-BE49-F238E27FC236}">
+                <a16:creationId xmlns:a16="http://schemas.microsoft.com/office/drawing/2014/main" id="{92651899-9E56-4B8D-FB42-9ACCFABB2AEC}"/>
               </a:ext>
             </a:extLst>
           </p:cNvPr>
@@ -4536,38 +5532,8 @@
         </p:blipFill>
         <p:spPr>
           <a:xfrm>
-            <a:off x="1014494" y="2125351"/>
-            <a:ext cx="3600450" cy="2362200"/>
-          </a:xfrm>
-          <a:prstGeom prst="rect">
-            <a:avLst/>
-          </a:prstGeom>
-        </p:spPr>
-      </p:pic>
-      <p:pic>
-        <p:nvPicPr>
-          <p:cNvPr id="8" name="圖片 7">
-            <a:extLst>
-              <a:ext uri="{FF2B5EF4-FFF2-40B4-BE49-F238E27FC236}">
-                <a16:creationId xmlns:a16="http://schemas.microsoft.com/office/drawing/2014/main" id="{30C10DA5-CF40-B9D2-D217-B386741B812D}"/>
-              </a:ext>
-            </a:extLst>
-          </p:cNvPr>
-          <p:cNvPicPr>
-            <a:picLocks noChangeAspect="1"/>
-          </p:cNvPicPr>
-          <p:nvPr/>
-        </p:nvPicPr>
-        <p:blipFill>
-          <a:blip r:embed="rId3"/>
-          <a:stretch>
-            <a:fillRect/>
-          </a:stretch>
-        </p:blipFill>
-        <p:spPr>
-          <a:xfrm>
-            <a:off x="5656327" y="603315"/>
-            <a:ext cx="5743575" cy="5619750"/>
+            <a:off x="917498" y="1935647"/>
+            <a:ext cx="4462370" cy="3383899"/>
           </a:xfrm>
           <a:prstGeom prst="rect">
             <a:avLst/>
@@ -4577,7 +5543,7 @@
     </p:spTree>
     <p:extLst>
       <p:ext uri="{BB962C8B-B14F-4D97-AF65-F5344CB8AC3E}">
-        <p14:creationId xmlns:p14="http://schemas.microsoft.com/office/powerpoint/2010/main" val="2476516935"/>
+        <p14:creationId xmlns:p14="http://schemas.microsoft.com/office/powerpoint/2010/main" val="1372084729"/>
       </p:ext>
     </p:extLst>
   </p:cSld>
@@ -4634,7 +5600,7 @@
           <a:p>
             <a:r>
               <a:rPr lang="en-US" altLang="zh-TW" dirty="0"/>
-              <a:t>Case2 weight range(-4, 4)</a:t>
+              <a:t>Case2 weight range(0, 1)</a:t>
             </a:r>
             <a:endParaRPr lang="zh-TW" altLang="en-US" dirty="0"/>
           </a:p>
@@ -4654,8 +5620,8 @@
         </p:nvSpPr>
         <p:spPr>
           <a:xfrm>
-            <a:off x="1203488" y="5070326"/>
-            <a:ext cx="3222463" cy="369332"/>
+            <a:off x="1674005" y="4671873"/>
+            <a:ext cx="4274034" cy="646331"/>
           </a:xfrm>
           <a:prstGeom prst="rect">
             <a:avLst/>
@@ -4669,8 +5635,14 @@
           <a:lstStyle/>
           <a:p>
             <a:r>
-              <a:rPr lang="en-US" altLang="zh-TW"/>
-              <a:t>Best Test Accuracy: 98.9196 %</a:t>
+              <a:rPr lang="en-US" altLang="zh-TW" b="0" i="0" dirty="0">
+                <a:solidFill>
+                  <a:srgbClr val="24292E"/>
+                </a:solidFill>
+                <a:effectLst/>
+                <a:latin typeface="Consolas" panose="020B0609020204030204" pitchFamily="49" charset="0"/>
+              </a:rPr>
+              <a:t>Best Test Accuracy: 33.1067 % Best Loss: 1.0990</a:t>
             </a:r>
             <a:endParaRPr lang="zh-TW" altLang="en-US" dirty="0"/>
           </a:p>
@@ -4678,10 +5650,10 @@
       </p:sp>
       <p:pic>
         <p:nvPicPr>
-          <p:cNvPr id="5" name="圖片 4">
-            <a:extLst>
-              <a:ext uri="{FF2B5EF4-FFF2-40B4-BE49-F238E27FC236}">
-                <a16:creationId xmlns:a16="http://schemas.microsoft.com/office/drawing/2014/main" id="{01B9CD40-82DF-C358-3163-98D3F3E8B456}"/>
+          <p:cNvPr id="3" name="圖片 2">
+            <a:extLst>
+              <a:ext uri="{FF2B5EF4-FFF2-40B4-BE49-F238E27FC236}">
+                <a16:creationId xmlns:a16="http://schemas.microsoft.com/office/drawing/2014/main" id="{6A3FC390-151F-01A6-E1A5-52CE83BEA46E}"/>
               </a:ext>
             </a:extLst>
           </p:cNvPr>
@@ -4698,8 +5670,8 @@
         </p:blipFill>
         <p:spPr>
           <a:xfrm>
-            <a:off x="955020" y="1787674"/>
-            <a:ext cx="3719398" cy="2718781"/>
+            <a:off x="1800087" y="1398915"/>
+            <a:ext cx="3776280" cy="2914233"/>
           </a:xfrm>
           <a:prstGeom prst="rect">
             <a:avLst/>
@@ -4708,10 +5680,10 @@
       </p:pic>
       <p:pic>
         <p:nvPicPr>
-          <p:cNvPr id="9" name="圖片 8">
-            <a:extLst>
-              <a:ext uri="{FF2B5EF4-FFF2-40B4-BE49-F238E27FC236}">
-                <a16:creationId xmlns:a16="http://schemas.microsoft.com/office/drawing/2014/main" id="{382FC376-0F2F-B7B7-462F-DBAD1674295D}"/>
+          <p:cNvPr id="8" name="圖片 7">
+            <a:extLst>
+              <a:ext uri="{FF2B5EF4-FFF2-40B4-BE49-F238E27FC236}">
+                <a16:creationId xmlns:a16="http://schemas.microsoft.com/office/drawing/2014/main" id="{C054940A-F0E4-C11C-F657-6B9F011B661A}"/>
               </a:ext>
             </a:extLst>
           </p:cNvPr>
@@ -4728,8 +5700,8 @@
         </p:blipFill>
         <p:spPr>
           <a:xfrm>
-            <a:off x="5614002" y="443826"/>
-            <a:ext cx="5948872" cy="5970348"/>
+            <a:off x="6324600" y="972647"/>
+            <a:ext cx="4710344" cy="4710344"/>
           </a:xfrm>
           <a:prstGeom prst="rect">
             <a:avLst/>
@@ -4739,7 +5711,7 @@
     </p:spTree>
     <p:extLst>
       <p:ext uri="{BB962C8B-B14F-4D97-AF65-F5344CB8AC3E}">
-        <p14:creationId xmlns:p14="http://schemas.microsoft.com/office/powerpoint/2010/main" val="1814585520"/>
+        <p14:creationId xmlns:p14="http://schemas.microsoft.com/office/powerpoint/2010/main" val="2008963848"/>
       </p:ext>
     </p:extLst>
   </p:cSld>
@@ -4796,7 +5768,7 @@
           <a:p>
             <a:r>
               <a:rPr lang="en-US" altLang="zh-TW" dirty="0"/>
-              <a:t>Case2 weight range(-6, 6)</a:t>
+              <a:t>Case2 weight range(-1, 1)</a:t>
             </a:r>
             <a:endParaRPr lang="zh-TW" altLang="en-US" dirty="0"/>
           </a:p>
@@ -4816,8 +5788,8 @@
         </p:nvSpPr>
         <p:spPr>
           <a:xfrm>
-            <a:off x="1203488" y="5070326"/>
-            <a:ext cx="3222463" cy="369332"/>
+            <a:off x="1674005" y="4671873"/>
+            <a:ext cx="4274034" cy="646331"/>
           </a:xfrm>
           <a:prstGeom prst="rect">
             <a:avLst/>
@@ -4831,8 +5803,14 @@
           <a:lstStyle/>
           <a:p>
             <a:r>
-              <a:rPr lang="en-US" altLang="zh-TW"/>
-              <a:t>Best Test Accuracy: 98.4112 %</a:t>
+              <a:rPr lang="en-US" altLang="zh-TW" b="0" i="0" dirty="0">
+                <a:solidFill>
+                  <a:srgbClr val="24292E"/>
+                </a:solidFill>
+                <a:effectLst/>
+                <a:latin typeface="Consolas" panose="020B0609020204030204" pitchFamily="49" charset="0"/>
+              </a:rPr>
+              <a:t>Best Test Accuracy: 66.2475 % Best Loss: 0.8844</a:t>
             </a:r>
             <a:endParaRPr lang="zh-TW" altLang="en-US" dirty="0"/>
           </a:p>
@@ -4840,10 +5818,10 @@
       </p:sp>
       <p:pic>
         <p:nvPicPr>
-          <p:cNvPr id="3" name="圖片 2">
-            <a:extLst>
-              <a:ext uri="{FF2B5EF4-FFF2-40B4-BE49-F238E27FC236}">
-                <a16:creationId xmlns:a16="http://schemas.microsoft.com/office/drawing/2014/main" id="{A0B72697-5956-65C7-055F-5A6DA43FF598}"/>
+          <p:cNvPr id="5" name="圖片 4">
+            <a:extLst>
+              <a:ext uri="{FF2B5EF4-FFF2-40B4-BE49-F238E27FC236}">
+                <a16:creationId xmlns:a16="http://schemas.microsoft.com/office/drawing/2014/main" id="{0B018CA3-132D-2EA4-9599-2288AF5780D4}"/>
               </a:ext>
             </a:extLst>
           </p:cNvPr>
@@ -4860,8 +5838,8 @@
         </p:blipFill>
         <p:spPr>
           <a:xfrm>
-            <a:off x="923826" y="1787674"/>
-            <a:ext cx="3827283" cy="2842928"/>
+            <a:off x="1674005" y="1242723"/>
+            <a:ext cx="3886376" cy="3045897"/>
           </a:xfrm>
           <a:prstGeom prst="rect">
             <a:avLst/>
@@ -4870,10 +5848,10 @@
       </p:pic>
       <p:pic>
         <p:nvPicPr>
-          <p:cNvPr id="8" name="圖片 7">
-            <a:extLst>
-              <a:ext uri="{FF2B5EF4-FFF2-40B4-BE49-F238E27FC236}">
-                <a16:creationId xmlns:a16="http://schemas.microsoft.com/office/drawing/2014/main" id="{08ED0AFF-F54C-31D9-BE7C-612F44A131B4}"/>
+          <p:cNvPr id="9" name="圖片 8">
+            <a:extLst>
+              <a:ext uri="{FF2B5EF4-FFF2-40B4-BE49-F238E27FC236}">
+                <a16:creationId xmlns:a16="http://schemas.microsoft.com/office/drawing/2014/main" id="{848DAEB1-AC19-DA08-B202-AE5EE478D157}"/>
               </a:ext>
             </a:extLst>
           </p:cNvPr>
@@ -4890,8 +5868,8 @@
         </p:blipFill>
         <p:spPr>
           <a:xfrm>
-            <a:off x="5637229" y="443060"/>
-            <a:ext cx="5950398" cy="5971880"/>
+            <a:off x="6021266" y="748308"/>
+            <a:ext cx="5275188" cy="5275188"/>
           </a:xfrm>
           <a:prstGeom prst="rect">
             <a:avLst/>
@@ -4901,7 +5879,7 @@
     </p:spTree>
     <p:extLst>
       <p:ext uri="{BB962C8B-B14F-4D97-AF65-F5344CB8AC3E}">
-        <p14:creationId xmlns:p14="http://schemas.microsoft.com/office/powerpoint/2010/main" val="2457229101"/>
+        <p14:creationId xmlns:p14="http://schemas.microsoft.com/office/powerpoint/2010/main" val="2020926745"/>
       </p:ext>
     </p:extLst>
   </p:cSld>

</xml_diff>